<commit_message>
updated pptx for UI class diagram
</commit_message>
<xml_diff>
--- a/docs/diagrams/UiComponentClassDiagram.pptx
+++ b/docs/diagrams/UiComponentClassDiagram.pptx
@@ -208,7 +208,7 @@
           <a:p>
             <a:fld id="{F5CC4B3F-88C1-4FFA-B1B6-F41C21DC6924}" type="datetimeFigureOut">
               <a:rPr lang="en-US" smtClean="0"/>
-              <a:t>1/7/2017</a:t>
+              <a:t>3/20/18</a:t>
             </a:fld>
             <a:endParaRPr lang="en-US"/>
           </a:p>
@@ -654,7 +654,7 @@
           <a:p>
             <a:fld id="{78C97017-6FC3-485B-9764-EAC9E56C1D49}" type="datetimeFigureOut">
               <a:rPr lang="en-US" smtClean="0"/>
-              <a:t>1/7/2017</a:t>
+              <a:t>3/20/18</a:t>
             </a:fld>
             <a:endParaRPr lang="en-US"/>
           </a:p>
@@ -822,7 +822,7 @@
           <a:p>
             <a:fld id="{78C97017-6FC3-485B-9764-EAC9E56C1D49}" type="datetimeFigureOut">
               <a:rPr lang="en-US" smtClean="0"/>
-              <a:t>1/7/2017</a:t>
+              <a:t>3/20/18</a:t>
             </a:fld>
             <a:endParaRPr lang="en-US"/>
           </a:p>
@@ -1000,7 +1000,7 @@
           <a:p>
             <a:fld id="{78C97017-6FC3-485B-9764-EAC9E56C1D49}" type="datetimeFigureOut">
               <a:rPr lang="en-US" smtClean="0"/>
-              <a:t>1/7/2017</a:t>
+              <a:t>3/20/18</a:t>
             </a:fld>
             <a:endParaRPr lang="en-US"/>
           </a:p>
@@ -1168,7 +1168,7 @@
           <a:p>
             <a:fld id="{78C97017-6FC3-485B-9764-EAC9E56C1D49}" type="datetimeFigureOut">
               <a:rPr lang="en-US" smtClean="0"/>
-              <a:t>1/7/2017</a:t>
+              <a:t>3/20/18</a:t>
             </a:fld>
             <a:endParaRPr lang="en-US"/>
           </a:p>
@@ -1413,7 +1413,7 @@
           <a:p>
             <a:fld id="{78C97017-6FC3-485B-9764-EAC9E56C1D49}" type="datetimeFigureOut">
               <a:rPr lang="en-US" smtClean="0"/>
-              <a:t>1/7/2017</a:t>
+              <a:t>3/20/18</a:t>
             </a:fld>
             <a:endParaRPr lang="en-US"/>
           </a:p>
@@ -1698,7 +1698,7 @@
           <a:p>
             <a:fld id="{78C97017-6FC3-485B-9764-EAC9E56C1D49}" type="datetimeFigureOut">
               <a:rPr lang="en-US" smtClean="0"/>
-              <a:t>1/7/2017</a:t>
+              <a:t>3/20/18</a:t>
             </a:fld>
             <a:endParaRPr lang="en-US"/>
           </a:p>
@@ -2117,7 +2117,7 @@
           <a:p>
             <a:fld id="{78C97017-6FC3-485B-9764-EAC9E56C1D49}" type="datetimeFigureOut">
               <a:rPr lang="en-US" smtClean="0"/>
-              <a:t>1/7/2017</a:t>
+              <a:t>3/20/18</a:t>
             </a:fld>
             <a:endParaRPr lang="en-US"/>
           </a:p>
@@ -2234,7 +2234,7 @@
           <a:p>
             <a:fld id="{78C97017-6FC3-485B-9764-EAC9E56C1D49}" type="datetimeFigureOut">
               <a:rPr lang="en-US" smtClean="0"/>
-              <a:t>1/7/2017</a:t>
+              <a:t>3/20/18</a:t>
             </a:fld>
             <a:endParaRPr lang="en-US"/>
           </a:p>
@@ -2329,7 +2329,7 @@
           <a:p>
             <a:fld id="{78C97017-6FC3-485B-9764-EAC9E56C1D49}" type="datetimeFigureOut">
               <a:rPr lang="en-US" smtClean="0"/>
-              <a:t>1/7/2017</a:t>
+              <a:t>3/20/18</a:t>
             </a:fld>
             <a:endParaRPr lang="en-US"/>
           </a:p>
@@ -2604,7 +2604,7 @@
           <a:p>
             <a:fld id="{78C97017-6FC3-485B-9764-EAC9E56C1D49}" type="datetimeFigureOut">
               <a:rPr lang="en-US" smtClean="0"/>
-              <a:t>1/7/2017</a:t>
+              <a:t>3/20/18</a:t>
             </a:fld>
             <a:endParaRPr lang="en-US"/>
           </a:p>
@@ -2856,7 +2856,7 @@
           <a:p>
             <a:fld id="{78C97017-6FC3-485B-9764-EAC9E56C1D49}" type="datetimeFigureOut">
               <a:rPr lang="en-US" smtClean="0"/>
-              <a:t>1/7/2017</a:t>
+              <a:t>3/20/18</a:t>
             </a:fld>
             <a:endParaRPr lang="en-US"/>
           </a:p>
@@ -3067,7 +3067,7 @@
           <a:p>
             <a:fld id="{78C97017-6FC3-485B-9764-EAC9E56C1D49}" type="datetimeFigureOut">
               <a:rPr lang="en-US" smtClean="0"/>
-              <a:t>1/7/2017</a:t>
+              <a:t>3/20/18</a:t>
             </a:fld>
             <a:endParaRPr lang="en-US"/>
           </a:p>
@@ -3451,7 +3451,7 @@
         <p:spPr>
           <a:xfrm>
             <a:off x="1217465" y="1447800"/>
-            <a:ext cx="4917083" cy="3962400"/>
+            <a:ext cx="4954735" cy="4267200"/>
           </a:xfrm>
           <a:prstGeom prst="roundRect">
             <a:avLst>
@@ -3925,7 +3925,7 @@
                   </a:schemeClr>
                 </a:solidFill>
               </a:rPr>
-              <a:t>BrowserPanel</a:t>
+              <a:t>CalendarPanel</a:t>
             </a:r>
             <a:endParaRPr lang="en-SG" sz="1050" b="1" dirty="0">
               <a:solidFill>
@@ -3945,7 +3945,7 @@
         </p:nvSpPr>
         <p:spPr>
           <a:xfrm>
-            <a:off x="2592527" y="4563759"/>
+            <a:off x="2592527" y="4939206"/>
             <a:ext cx="1093635" cy="236841"/>
           </a:xfrm>
           <a:prstGeom prst="rect">
@@ -4005,7 +4005,7 @@
         </p:nvSpPr>
         <p:spPr>
           <a:xfrm>
-            <a:off x="2592526" y="3991960"/>
+            <a:off x="2576025" y="4348387"/>
             <a:ext cx="1093635" cy="236841"/>
           </a:xfrm>
           <a:prstGeom prst="rect">
@@ -4065,7 +4065,7 @@
         </p:nvSpPr>
         <p:spPr>
           <a:xfrm>
-            <a:off x="3839323" y="4228801"/>
+            <a:off x="3857946" y="4639067"/>
             <a:ext cx="1040906" cy="236841"/>
           </a:xfrm>
           <a:prstGeom prst="rect">
@@ -4125,7 +4125,7 @@
         </p:nvSpPr>
         <p:spPr>
           <a:xfrm>
-            <a:off x="2592528" y="4966000"/>
+            <a:off x="2592524" y="5339114"/>
             <a:ext cx="1093635" cy="236841"/>
           </a:xfrm>
           <a:prstGeom prst="rect">
@@ -4378,8 +4378,8 @@
         </p:nvCxnSpPr>
         <p:spPr>
           <a:xfrm rot="16200000" flipH="1">
-            <a:off x="1883148" y="3401003"/>
-            <a:ext cx="1242356" cy="176400"/>
+            <a:off x="1696684" y="3587466"/>
+            <a:ext cx="1598783" cy="159899"/>
           </a:xfrm>
           <a:prstGeom prst="bentConnector2">
             <a:avLst/>
@@ -4419,8 +4419,8 @@
         </p:nvCxnSpPr>
         <p:spPr>
           <a:xfrm rot="16200000" flipH="1">
-            <a:off x="1597249" y="3686901"/>
-            <a:ext cx="1814155" cy="176401"/>
+            <a:off x="1409525" y="3874625"/>
+            <a:ext cx="2189602" cy="176401"/>
           </a:xfrm>
           <a:prstGeom prst="bentConnector2">
             <a:avLst/>
@@ -4453,14 +4453,15 @@
         <p:nvCxnSpPr>
           <p:cNvPr id="53" name="Elbow Connector 63"/>
           <p:cNvCxnSpPr>
+            <a:cxnSpLocks/>
             <a:endCxn id="38" idx="1"/>
           </p:cNvCxnSpPr>
           <p:nvPr/>
         </p:nvCxnSpPr>
         <p:spPr>
           <a:xfrm rot="16200000" flipH="1">
-            <a:off x="1184119" y="3676012"/>
-            <a:ext cx="2396440" cy="420377"/>
+            <a:off x="1004642" y="3869652"/>
+            <a:ext cx="2780929" cy="394835"/>
           </a:xfrm>
           <a:prstGeom prst="bentConnector2">
             <a:avLst/>
@@ -4620,8 +4621,8 @@
         </p:nvCxnSpPr>
         <p:spPr>
           <a:xfrm rot="5400000">
-            <a:off x="4174488" y="2991741"/>
-            <a:ext cx="2061222" cy="649740"/>
+            <a:off x="3978667" y="3206186"/>
+            <a:ext cx="2471488" cy="631117"/>
           </a:xfrm>
           <a:prstGeom prst="bentConnector2">
             <a:avLst/>
@@ -4743,8 +4744,8 @@
         </p:nvCxnSpPr>
         <p:spPr>
           <a:xfrm rot="5400000">
-            <a:off x="3409976" y="2562187"/>
-            <a:ext cx="2396180" cy="1843807"/>
+            <a:off x="3222253" y="2749910"/>
+            <a:ext cx="2771627" cy="1843807"/>
           </a:xfrm>
           <a:prstGeom prst="bentConnector2">
             <a:avLst/>
@@ -4784,8 +4785,8 @@
         </p:nvCxnSpPr>
         <p:spPr>
           <a:xfrm rot="5400000">
-            <a:off x="3208856" y="2763307"/>
-            <a:ext cx="2798421" cy="1843806"/>
+            <a:off x="3022297" y="2949862"/>
+            <a:ext cx="3171535" cy="1843810"/>
           </a:xfrm>
           <a:prstGeom prst="bentConnector2">
             <a:avLst/>
@@ -5120,14 +5121,13 @@
         <p:nvCxnSpPr>
           <p:cNvPr id="132" name="Elbow Connector 63"/>
           <p:cNvCxnSpPr>
-            <a:stCxn id="16" idx="3"/>
-            <a:endCxn id="3" idx="3"/>
+            <a:cxnSpLocks/>
           </p:cNvCxnSpPr>
           <p:nvPr/>
         </p:nvCxnSpPr>
         <p:spPr>
           <a:xfrm rot="5400000">
-            <a:off x="4205956" y="1766207"/>
+            <a:off x="4205453" y="1791170"/>
             <a:ext cx="804221" cy="1843806"/>
           </a:xfrm>
           <a:prstGeom prst="bentConnector2">
@@ -5168,8 +5168,8 @@
         </p:nvCxnSpPr>
         <p:spPr>
           <a:xfrm rot="16200000" flipH="1">
-            <a:off x="3430123" y="3938021"/>
-            <a:ext cx="118421" cy="699979"/>
+            <a:off x="3404264" y="4303806"/>
+            <a:ext cx="172260" cy="735103"/>
           </a:xfrm>
           <a:prstGeom prst="bentConnector2">
             <a:avLst/>
@@ -5202,15 +5202,14 @@
         <p:nvCxnSpPr>
           <p:cNvPr id="140" name="Elbow Connector 63"/>
           <p:cNvCxnSpPr>
-            <a:stCxn id="16" idx="3"/>
-            <a:endCxn id="36" idx="3"/>
+            <a:cxnSpLocks/>
           </p:cNvCxnSpPr>
           <p:nvPr/>
         </p:nvCxnSpPr>
         <p:spPr>
           <a:xfrm rot="5400000">
-            <a:off x="3695875" y="2276286"/>
-            <a:ext cx="1824381" cy="1843808"/>
+            <a:off x="3499803" y="2464296"/>
+            <a:ext cx="2180808" cy="1860309"/>
           </a:xfrm>
           <a:prstGeom prst="bentConnector2">
             <a:avLst/>
@@ -5381,9 +5380,9 @@
           <p:nvPr/>
         </p:nvSpPr>
         <p:spPr>
-          <a:xfrm>
-            <a:off x="5431573" y="4488138"/>
-            <a:ext cx="229325" cy="160062"/>
+          <a:xfrm flipV="1">
+            <a:off x="5431573" y="4442419"/>
+            <a:ext cx="229325" cy="45719"/>
           </a:xfrm>
           <a:prstGeom prst="rect">
             <a:avLst/>
@@ -5435,7 +5434,7 @@
         </p:nvSpPr>
         <p:spPr>
           <a:xfrm flipV="1">
-            <a:off x="4114799" y="4472708"/>
+            <a:off x="4110475" y="4882254"/>
             <a:ext cx="2642195" cy="101600"/>
           </a:xfrm>
           <a:custGeom>
@@ -5509,6 +5508,166 @@
           </a:p>
         </p:txBody>
       </p:sp>
+      <p:cxnSp>
+        <p:nvCxnSpPr>
+          <p:cNvPr id="59" name="Elbow Connector 63">
+            <a:extLst>
+              <a:ext uri="{FF2B5EF4-FFF2-40B4-BE49-F238E27FC236}">
+                <a16:creationId xmlns:a16="http://schemas.microsoft.com/office/drawing/2014/main" id="{6691A39C-6C4D-A840-8480-8A8409FFF8F1}"/>
+              </a:ext>
+            </a:extLst>
+          </p:cNvPr>
+          <p:cNvCxnSpPr>
+            <a:cxnSpLocks/>
+          </p:cNvCxnSpPr>
+          <p:nvPr/>
+        </p:nvCxnSpPr>
+        <p:spPr>
+          <a:xfrm rot="16200000" flipH="1">
+            <a:off x="2053664" y="3594953"/>
+            <a:ext cx="899755" cy="176402"/>
+          </a:xfrm>
+          <a:prstGeom prst="bentConnector2">
+            <a:avLst/>
+          </a:prstGeom>
+          <a:ln w="19050">
+            <a:solidFill>
+              <a:schemeClr val="accent3"/>
+            </a:solidFill>
+            <a:headEnd type="none" w="med" len="med"/>
+            <a:tailEnd type="arrow" w="med" len="med"/>
+          </a:ln>
+          <a:effectLst/>
+        </p:spPr>
+        <p:style>
+          <a:lnRef idx="1">
+            <a:schemeClr val="accent2"/>
+          </a:lnRef>
+          <a:fillRef idx="2">
+            <a:schemeClr val="accent2"/>
+          </a:fillRef>
+          <a:effectRef idx="1">
+            <a:schemeClr val="accent2"/>
+          </a:effectRef>
+          <a:fontRef idx="minor">
+            <a:schemeClr val="dk1"/>
+          </a:fontRef>
+        </p:style>
+      </p:cxnSp>
+      <p:sp>
+        <p:nvSpPr>
+          <p:cNvPr id="60" name="Rectangle 11">
+            <a:extLst>
+              <a:ext uri="{FF2B5EF4-FFF2-40B4-BE49-F238E27FC236}">
+                <a16:creationId xmlns:a16="http://schemas.microsoft.com/office/drawing/2014/main" id="{51918ACF-D4AC-D844-A020-F4D1D5298BF3}"/>
+              </a:ext>
+            </a:extLst>
+          </p:cNvPr>
+          <p:cNvSpPr/>
+          <p:nvPr/>
+        </p:nvSpPr>
+        <p:spPr>
+          <a:xfrm>
+            <a:off x="2587707" y="3987138"/>
+            <a:ext cx="1093635" cy="236841"/>
+          </a:xfrm>
+          <a:prstGeom prst="rect">
+            <a:avLst/>
+          </a:prstGeom>
+          <a:ln w="19050">
+            <a:solidFill>
+              <a:schemeClr val="accent3"/>
+            </a:solidFill>
+          </a:ln>
+          <a:effectLst/>
+        </p:spPr>
+        <p:style>
+          <a:lnRef idx="1">
+            <a:schemeClr val="accent3"/>
+          </a:lnRef>
+          <a:fillRef idx="2">
+            <a:schemeClr val="accent3"/>
+          </a:fillRef>
+          <a:effectRef idx="1">
+            <a:schemeClr val="accent3"/>
+          </a:effectRef>
+          <a:fontRef idx="minor">
+            <a:schemeClr val="dk1"/>
+          </a:fontRef>
+        </p:style>
+        <p:txBody>
+          <a:bodyPr rtlCol="0" anchor="ctr"/>
+          <a:lstStyle/>
+          <a:p>
+            <a:pPr algn="ctr"/>
+            <a:r>
+              <a:rPr lang="en-US" sz="1050" b="1" dirty="0" err="1">
+                <a:solidFill>
+                  <a:schemeClr val="accent3">
+                    <a:lumMod val="75000"/>
+                  </a:schemeClr>
+                </a:solidFill>
+              </a:rPr>
+              <a:t>MapPanel</a:t>
+            </a:r>
+            <a:endParaRPr lang="en-SG" sz="1050" b="1" dirty="0">
+              <a:solidFill>
+                <a:schemeClr val="accent3">
+                  <a:lumMod val="75000"/>
+                </a:schemeClr>
+              </a:solidFill>
+            </a:endParaRPr>
+          </a:p>
+        </p:txBody>
+      </p:sp>
+      <p:cxnSp>
+        <p:nvCxnSpPr>
+          <p:cNvPr id="61" name="Elbow Connector 63">
+            <a:extLst>
+              <a:ext uri="{FF2B5EF4-FFF2-40B4-BE49-F238E27FC236}">
+                <a16:creationId xmlns:a16="http://schemas.microsoft.com/office/drawing/2014/main" id="{E6919FDF-9AE4-364C-BEFF-F4561F3FE241}"/>
+              </a:ext>
+            </a:extLst>
+          </p:cNvPr>
+          <p:cNvCxnSpPr>
+            <a:cxnSpLocks/>
+          </p:cNvCxnSpPr>
+          <p:nvPr/>
+        </p:nvCxnSpPr>
+        <p:spPr>
+          <a:xfrm rot="10800000" flipV="1">
+            <a:off x="3690584" y="2297699"/>
+            <a:ext cx="1833638" cy="1796005"/>
+          </a:xfrm>
+          <a:prstGeom prst="bentConnector3">
+            <a:avLst>
+              <a:gd name="adj1" fmla="val -321"/>
+            </a:avLst>
+          </a:prstGeom>
+          <a:ln w="6350">
+            <a:solidFill>
+              <a:schemeClr val="accent3"/>
+            </a:solidFill>
+            <a:headEnd type="none" w="med" len="med"/>
+            <a:tailEnd type="none" w="med" len="med"/>
+          </a:ln>
+          <a:effectLst/>
+        </p:spPr>
+        <p:style>
+          <a:lnRef idx="1">
+            <a:schemeClr val="accent2"/>
+          </a:lnRef>
+          <a:fillRef idx="2">
+            <a:schemeClr val="accent2"/>
+          </a:fillRef>
+          <a:effectRef idx="1">
+            <a:schemeClr val="accent2"/>
+          </a:effectRef>
+          <a:fontRef idx="minor">
+            <a:schemeClr val="dk1"/>
+          </a:fontRef>
+        </p:style>
+      </p:cxnSp>
     </p:spTree>
     <p:extLst>
       <p:ext uri="{BB962C8B-B14F-4D97-AF65-F5344CB8AC3E}">

</xml_diff>

<commit_message>
update diagrams and project portfolio
</commit_message>
<xml_diff>
--- a/docs/diagrams/UiComponentClassDiagram.pptx
+++ b/docs/diagrams/UiComponentClassDiagram.pptx
@@ -208,7 +208,7 @@
           <a:p>
             <a:fld id="{F5CC4B3F-88C1-4FFA-B1B6-F41C21DC6924}" type="datetimeFigureOut">
               <a:rPr lang="en-US" smtClean="0"/>
-              <a:t>3/20/18</a:t>
+              <a:t>4/14/2018</a:t>
             </a:fld>
             <a:endParaRPr lang="en-US"/>
           </a:p>
@@ -654,7 +654,7 @@
           <a:p>
             <a:fld id="{78C97017-6FC3-485B-9764-EAC9E56C1D49}" type="datetimeFigureOut">
               <a:rPr lang="en-US" smtClean="0"/>
-              <a:t>3/20/18</a:t>
+              <a:t>4/14/2018</a:t>
             </a:fld>
             <a:endParaRPr lang="en-US"/>
           </a:p>
@@ -822,7 +822,7 @@
           <a:p>
             <a:fld id="{78C97017-6FC3-485B-9764-EAC9E56C1D49}" type="datetimeFigureOut">
               <a:rPr lang="en-US" smtClean="0"/>
-              <a:t>3/20/18</a:t>
+              <a:t>4/14/2018</a:t>
             </a:fld>
             <a:endParaRPr lang="en-US"/>
           </a:p>
@@ -1000,7 +1000,7 @@
           <a:p>
             <a:fld id="{78C97017-6FC3-485B-9764-EAC9E56C1D49}" type="datetimeFigureOut">
               <a:rPr lang="en-US" smtClean="0"/>
-              <a:t>3/20/18</a:t>
+              <a:t>4/14/2018</a:t>
             </a:fld>
             <a:endParaRPr lang="en-US"/>
           </a:p>
@@ -1168,7 +1168,7 @@
           <a:p>
             <a:fld id="{78C97017-6FC3-485B-9764-EAC9E56C1D49}" type="datetimeFigureOut">
               <a:rPr lang="en-US" smtClean="0"/>
-              <a:t>3/20/18</a:t>
+              <a:t>4/14/2018</a:t>
             </a:fld>
             <a:endParaRPr lang="en-US"/>
           </a:p>
@@ -1413,7 +1413,7 @@
           <a:p>
             <a:fld id="{78C97017-6FC3-485B-9764-EAC9E56C1D49}" type="datetimeFigureOut">
               <a:rPr lang="en-US" smtClean="0"/>
-              <a:t>3/20/18</a:t>
+              <a:t>4/14/2018</a:t>
             </a:fld>
             <a:endParaRPr lang="en-US"/>
           </a:p>
@@ -1698,7 +1698,7 @@
           <a:p>
             <a:fld id="{78C97017-6FC3-485B-9764-EAC9E56C1D49}" type="datetimeFigureOut">
               <a:rPr lang="en-US" smtClean="0"/>
-              <a:t>3/20/18</a:t>
+              <a:t>4/14/2018</a:t>
             </a:fld>
             <a:endParaRPr lang="en-US"/>
           </a:p>
@@ -2117,7 +2117,7 @@
           <a:p>
             <a:fld id="{78C97017-6FC3-485B-9764-EAC9E56C1D49}" type="datetimeFigureOut">
               <a:rPr lang="en-US" smtClean="0"/>
-              <a:t>3/20/18</a:t>
+              <a:t>4/14/2018</a:t>
             </a:fld>
             <a:endParaRPr lang="en-US"/>
           </a:p>
@@ -2234,7 +2234,7 @@
           <a:p>
             <a:fld id="{78C97017-6FC3-485B-9764-EAC9E56C1D49}" type="datetimeFigureOut">
               <a:rPr lang="en-US" smtClean="0"/>
-              <a:t>3/20/18</a:t>
+              <a:t>4/14/2018</a:t>
             </a:fld>
             <a:endParaRPr lang="en-US"/>
           </a:p>
@@ -2329,7 +2329,7 @@
           <a:p>
             <a:fld id="{78C97017-6FC3-485B-9764-EAC9E56C1D49}" type="datetimeFigureOut">
               <a:rPr lang="en-US" smtClean="0"/>
-              <a:t>3/20/18</a:t>
+              <a:t>4/14/2018</a:t>
             </a:fld>
             <a:endParaRPr lang="en-US"/>
           </a:p>
@@ -2604,7 +2604,7 @@
           <a:p>
             <a:fld id="{78C97017-6FC3-485B-9764-EAC9E56C1D49}" type="datetimeFigureOut">
               <a:rPr lang="en-US" smtClean="0"/>
-              <a:t>3/20/18</a:t>
+              <a:t>4/14/2018</a:t>
             </a:fld>
             <a:endParaRPr lang="en-US"/>
           </a:p>
@@ -2856,7 +2856,7 @@
           <a:p>
             <a:fld id="{78C97017-6FC3-485B-9764-EAC9E56C1D49}" type="datetimeFigureOut">
               <a:rPr lang="en-US" smtClean="0"/>
-              <a:t>3/20/18</a:t>
+              <a:t>4/14/2018</a:t>
             </a:fld>
             <a:endParaRPr lang="en-US"/>
           </a:p>
@@ -3067,7 +3067,7 @@
           <a:p>
             <a:fld id="{78C97017-6FC3-485B-9764-EAC9E56C1D49}" type="datetimeFigureOut">
               <a:rPr lang="en-US" smtClean="0"/>
-              <a:t>3/20/18</a:t>
+              <a:t>4/14/2018</a:t>
             </a:fld>
             <a:endParaRPr lang="en-US"/>
           </a:p>
@@ -3450,8 +3450,8 @@
         </p:nvSpPr>
         <p:spPr>
           <a:xfrm>
-            <a:off x="1217465" y="1447800"/>
-            <a:ext cx="4954735" cy="4267200"/>
+            <a:off x="1217465" y="1447799"/>
+            <a:ext cx="4954735" cy="4952987"/>
           </a:xfrm>
           <a:prstGeom prst="roundRect">
             <a:avLst>
@@ -4778,14 +4778,13 @@
         <p:nvCxnSpPr>
           <p:cNvPr id="94" name="Elbow Connector 63"/>
           <p:cNvCxnSpPr>
-            <a:stCxn id="16" idx="3"/>
-            <a:endCxn id="38" idx="3"/>
+            <a:cxnSpLocks/>
           </p:cNvCxnSpPr>
           <p:nvPr/>
         </p:nvCxnSpPr>
         <p:spPr>
           <a:xfrm rot="5400000">
-            <a:off x="3022297" y="2949862"/>
+            <a:off x="3022297" y="2949863"/>
             <a:ext cx="3171535" cy="1843810"/>
           </a:xfrm>
           <a:prstGeom prst="bentConnector2">
@@ -5642,6 +5641,168 @@
           <a:prstGeom prst="bentConnector3">
             <a:avLst>
               <a:gd name="adj1" fmla="val -321"/>
+            </a:avLst>
+          </a:prstGeom>
+          <a:ln w="6350">
+            <a:solidFill>
+              <a:schemeClr val="accent3"/>
+            </a:solidFill>
+            <a:headEnd type="none" w="med" len="med"/>
+            <a:tailEnd type="none" w="med" len="med"/>
+          </a:ln>
+          <a:effectLst/>
+        </p:spPr>
+        <p:style>
+          <a:lnRef idx="1">
+            <a:schemeClr val="accent2"/>
+          </a:lnRef>
+          <a:fillRef idx="2">
+            <a:schemeClr val="accent2"/>
+          </a:fillRef>
+          <a:effectRef idx="1">
+            <a:schemeClr val="accent2"/>
+          </a:effectRef>
+          <a:fontRef idx="minor">
+            <a:schemeClr val="dk1"/>
+          </a:fontRef>
+        </p:style>
+      </p:cxnSp>
+      <p:cxnSp>
+        <p:nvCxnSpPr>
+          <p:cNvPr id="45" name="Elbow Connector 63">
+            <a:extLst>
+              <a:ext uri="{FF2B5EF4-FFF2-40B4-BE49-F238E27FC236}">
+                <a16:creationId xmlns:a16="http://schemas.microsoft.com/office/drawing/2014/main" id="{70A4765C-B2C1-4C58-A129-C7BA5CAF05C5}"/>
+              </a:ext>
+            </a:extLst>
+          </p:cNvPr>
+          <p:cNvCxnSpPr>
+            <a:cxnSpLocks/>
+          </p:cNvCxnSpPr>
+          <p:nvPr/>
+        </p:nvCxnSpPr>
+        <p:spPr>
+          <a:xfrm rot="16200000" flipH="1">
+            <a:off x="715066" y="4080567"/>
+            <a:ext cx="3266996" cy="459070"/>
+          </a:xfrm>
+          <a:prstGeom prst="bentConnector3">
+            <a:avLst>
+              <a:gd name="adj1" fmla="val 99950"/>
+            </a:avLst>
+          </a:prstGeom>
+          <a:ln w="19050">
+            <a:solidFill>
+              <a:schemeClr val="accent3"/>
+            </a:solidFill>
+            <a:headEnd type="none" w="med" len="med"/>
+            <a:tailEnd type="arrow" w="med" len="med"/>
+          </a:ln>
+          <a:effectLst/>
+        </p:spPr>
+        <p:style>
+          <a:lnRef idx="1">
+            <a:schemeClr val="accent2"/>
+          </a:lnRef>
+          <a:fillRef idx="2">
+            <a:schemeClr val="accent2"/>
+          </a:fillRef>
+          <a:effectRef idx="1">
+            <a:schemeClr val="accent2"/>
+          </a:effectRef>
+          <a:fontRef idx="minor">
+            <a:schemeClr val="dk1"/>
+          </a:fontRef>
+        </p:style>
+      </p:cxnSp>
+      <p:sp>
+        <p:nvSpPr>
+          <p:cNvPr id="54" name="Rectangle 11">
+            <a:extLst>
+              <a:ext uri="{FF2B5EF4-FFF2-40B4-BE49-F238E27FC236}">
+                <a16:creationId xmlns:a16="http://schemas.microsoft.com/office/drawing/2014/main" id="{D38431B8-1B0D-4F78-9530-D40BA9EC9E2E}"/>
+              </a:ext>
+            </a:extLst>
+          </p:cNvPr>
+          <p:cNvSpPr/>
+          <p:nvPr/>
+        </p:nvSpPr>
+        <p:spPr>
+          <a:xfrm>
+            <a:off x="2592366" y="5837196"/>
+            <a:ext cx="1446234" cy="278309"/>
+          </a:xfrm>
+          <a:prstGeom prst="rect">
+            <a:avLst/>
+          </a:prstGeom>
+          <a:ln w="19050">
+            <a:solidFill>
+              <a:schemeClr val="accent3"/>
+            </a:solidFill>
+          </a:ln>
+          <a:effectLst/>
+        </p:spPr>
+        <p:style>
+          <a:lnRef idx="1">
+            <a:schemeClr val="accent3"/>
+          </a:lnRef>
+          <a:fillRef idx="2">
+            <a:schemeClr val="accent3"/>
+          </a:fillRef>
+          <a:effectRef idx="1">
+            <a:schemeClr val="accent3"/>
+          </a:effectRef>
+          <a:fontRef idx="minor">
+            <a:schemeClr val="dk1"/>
+          </a:fontRef>
+        </p:style>
+        <p:txBody>
+          <a:bodyPr rtlCol="0" anchor="ctr"/>
+          <a:lstStyle/>
+          <a:p>
+            <a:pPr algn="ctr"/>
+            <a:r>
+              <a:rPr lang="en-US" sz="1050" b="1" dirty="0" err="1">
+                <a:solidFill>
+                  <a:schemeClr val="accent3">
+                    <a:lumMod val="75000"/>
+                  </a:schemeClr>
+                </a:solidFill>
+              </a:rPr>
+              <a:t>AppointmentListPanel</a:t>
+            </a:r>
+            <a:endParaRPr lang="en-SG" sz="1050" b="1" dirty="0">
+              <a:solidFill>
+                <a:schemeClr val="accent3">
+                  <a:lumMod val="75000"/>
+                </a:schemeClr>
+              </a:solidFill>
+            </a:endParaRPr>
+          </a:p>
+        </p:txBody>
+      </p:sp>
+      <p:cxnSp>
+        <p:nvCxnSpPr>
+          <p:cNvPr id="55" name="Elbow Connector 63">
+            <a:extLst>
+              <a:ext uri="{FF2B5EF4-FFF2-40B4-BE49-F238E27FC236}">
+                <a16:creationId xmlns:a16="http://schemas.microsoft.com/office/drawing/2014/main" id="{3FE242D9-DBAE-4FC9-A363-6FCF406F0D3B}"/>
+              </a:ext>
+            </a:extLst>
+          </p:cNvPr>
+          <p:cNvCxnSpPr>
+            <a:cxnSpLocks/>
+          </p:cNvCxnSpPr>
+          <p:nvPr/>
+        </p:nvCxnSpPr>
+        <p:spPr>
+          <a:xfrm rot="5400000">
+            <a:off x="2957144" y="3399786"/>
+            <a:ext cx="3654281" cy="1491370"/>
+          </a:xfrm>
+          <a:prstGeom prst="bentConnector3">
+            <a:avLst>
+              <a:gd name="adj1" fmla="val 100237"/>
             </a:avLst>
           </a:prstGeom>
           <a:ln w="6350">

</xml_diff>